<commit_message>
- Some logo/icon updates - Implemented History list and transaction info dialog fragment - Implemented globally accessible static context and method in Singleton class
</commit_message>
<xml_diff>
--- a/PayFive/assets/logo_work.pptx
+++ b/PayFive/assets/logo_work.pptx
@@ -3451,7 +3451,7 @@
       </p:pic>
       <p:pic>
         <p:nvPicPr>
-          <p:cNvPr id="19" name="Picture 18" descr="dollar_color.png"/>
+          <p:cNvPr id="2" name="Picture 1" descr="dollar.png"/>
           <p:cNvPicPr>
             <a:picLocks noChangeAspect="1"/>
           </p:cNvPicPr>
@@ -3460,6 +3460,15 @@
         <p:blipFill>
           <a:blip r:embed="rId5">
             <a:extLst>
+              <a:ext uri="{BEBA8EAE-BF5A-486C-A8C5-ECC9F3942E4B}">
+                <a14:imgProps xmlns:a14="http://schemas.microsoft.com/office/drawing/2010/main">
+                  <a14:imgLayer r:embed="rId6">
+                    <a14:imgEffect>
+                      <a14:brightnessContrast bright="20000"/>
+                    </a14:imgEffect>
+                  </a14:imgLayer>
+                </a14:imgProps>
+              </a:ext>
               <a:ext uri="{28A0092B-C50C-407E-A947-70E740481C1C}">
                 <a14:useLocalDpi xmlns:a14="http://schemas.microsoft.com/office/drawing/2010/main" val="0"/>
               </a:ext>
@@ -3471,12 +3480,21 @@
         </p:blipFill>
         <p:spPr>
           <a:xfrm>
-            <a:off x="1414980" y="3058931"/>
-            <a:ext cx="540965" cy="820855"/>
+            <a:off x="1488967" y="3053238"/>
+            <a:ext cx="446690" cy="877707"/>
           </a:xfrm>
           <a:prstGeom prst="rect">
             <a:avLst/>
           </a:prstGeom>
+          <a:effectLst>
+            <a:outerShdw blurRad="63500" sx="102000" sy="102000" algn="ctr" rotWithShape="0">
+              <a:schemeClr val="tx1">
+                <a:lumMod val="50000"/>
+                <a:lumOff val="50000"/>
+                <a:alpha val="40000"/>
+              </a:schemeClr>
+            </a:outerShdw>
+          </a:effectLst>
         </p:spPr>
       </p:pic>
     </p:spTree>

</xml_diff>

<commit_message>
Logo updated to a flat style
</commit_message>
<xml_diff>
--- a/PayFive/assets/logo_work.pptx
+++ b/PayFive/assets/logo_work.pptx
@@ -5,8 +5,11 @@
     <p:sldMasterId id="2147483648" r:id="rId1"/>
   </p:sldMasterIdLst>
   <p:sldIdLst>
-    <p:sldId id="256" r:id="rId2"/>
-    <p:sldId id="257" r:id="rId3"/>
+    <p:sldId id="261" r:id="rId2"/>
+    <p:sldId id="259" r:id="rId3"/>
+    <p:sldId id="260" r:id="rId4"/>
+    <p:sldId id="257" r:id="rId5"/>
+    <p:sldId id="256" r:id="rId6"/>
   </p:sldIdLst>
   <p:sldSz cx="9144000" cy="6858000" type="letter"/>
   <p:notesSz cx="6858000" cy="9144000"/>
@@ -289,7 +292,7 @@
           <a:p>
             <a:fld id="{C662B260-CBBC-FD45-B27E-3D39246EC016}" type="datetimeFigureOut">
               <a:rPr lang="en-US" smtClean="0"/>
-              <a:t>3/24/14</a:t>
+              <a:t>3/26/14</a:t>
             </a:fld>
             <a:endParaRPr lang="en-US"/>
           </a:p>
@@ -459,7 +462,7 @@
           <a:p>
             <a:fld id="{C662B260-CBBC-FD45-B27E-3D39246EC016}" type="datetimeFigureOut">
               <a:rPr lang="en-US" smtClean="0"/>
-              <a:t>3/24/14</a:t>
+              <a:t>3/26/14</a:t>
             </a:fld>
             <a:endParaRPr lang="en-US"/>
           </a:p>
@@ -639,7 +642,7 @@
           <a:p>
             <a:fld id="{C662B260-CBBC-FD45-B27E-3D39246EC016}" type="datetimeFigureOut">
               <a:rPr lang="en-US" smtClean="0"/>
-              <a:t>3/24/14</a:t>
+              <a:t>3/26/14</a:t>
             </a:fld>
             <a:endParaRPr lang="en-US"/>
           </a:p>
@@ -809,7 +812,7 @@
           <a:p>
             <a:fld id="{C662B260-CBBC-FD45-B27E-3D39246EC016}" type="datetimeFigureOut">
               <a:rPr lang="en-US" smtClean="0"/>
-              <a:t>3/24/14</a:t>
+              <a:t>3/26/14</a:t>
             </a:fld>
             <a:endParaRPr lang="en-US"/>
           </a:p>
@@ -1055,7 +1058,7 @@
           <a:p>
             <a:fld id="{C662B260-CBBC-FD45-B27E-3D39246EC016}" type="datetimeFigureOut">
               <a:rPr lang="en-US" smtClean="0"/>
-              <a:t>3/24/14</a:t>
+              <a:t>3/26/14</a:t>
             </a:fld>
             <a:endParaRPr lang="en-US"/>
           </a:p>
@@ -1343,7 +1346,7 @@
           <a:p>
             <a:fld id="{C662B260-CBBC-FD45-B27E-3D39246EC016}" type="datetimeFigureOut">
               <a:rPr lang="en-US" smtClean="0"/>
-              <a:t>3/24/14</a:t>
+              <a:t>3/26/14</a:t>
             </a:fld>
             <a:endParaRPr lang="en-US"/>
           </a:p>
@@ -1765,7 +1768,7 @@
           <a:p>
             <a:fld id="{C662B260-CBBC-FD45-B27E-3D39246EC016}" type="datetimeFigureOut">
               <a:rPr lang="en-US" smtClean="0"/>
-              <a:t>3/24/14</a:t>
+              <a:t>3/26/14</a:t>
             </a:fld>
             <a:endParaRPr lang="en-US"/>
           </a:p>
@@ -1883,7 +1886,7 @@
           <a:p>
             <a:fld id="{C662B260-CBBC-FD45-B27E-3D39246EC016}" type="datetimeFigureOut">
               <a:rPr lang="en-US" smtClean="0"/>
-              <a:t>3/24/14</a:t>
+              <a:t>3/26/14</a:t>
             </a:fld>
             <a:endParaRPr lang="en-US"/>
           </a:p>
@@ -1978,7 +1981,7 @@
           <a:p>
             <a:fld id="{C662B260-CBBC-FD45-B27E-3D39246EC016}" type="datetimeFigureOut">
               <a:rPr lang="en-US" smtClean="0"/>
-              <a:t>3/24/14</a:t>
+              <a:t>3/26/14</a:t>
             </a:fld>
             <a:endParaRPr lang="en-US"/>
           </a:p>
@@ -2255,7 +2258,7 @@
           <a:p>
             <a:fld id="{C662B260-CBBC-FD45-B27E-3D39246EC016}" type="datetimeFigureOut">
               <a:rPr lang="en-US" smtClean="0"/>
-              <a:t>3/24/14</a:t>
+              <a:t>3/26/14</a:t>
             </a:fld>
             <a:endParaRPr lang="en-US"/>
           </a:p>
@@ -2508,7 +2511,7 @@
           <a:p>
             <a:fld id="{C662B260-CBBC-FD45-B27E-3D39246EC016}" type="datetimeFigureOut">
               <a:rPr lang="en-US" smtClean="0"/>
-              <a:t>3/24/14</a:t>
+              <a:t>3/26/14</a:t>
             </a:fld>
             <a:endParaRPr lang="en-US"/>
           </a:p>
@@ -2721,7 +2724,7 @@
           <a:p>
             <a:fld id="{C662B260-CBBC-FD45-B27E-3D39246EC016}" type="datetimeFigureOut">
               <a:rPr lang="en-US" smtClean="0"/>
-              <a:t>3/24/14</a:t>
+              <a:t>3/26/14</a:t>
             </a:fld>
             <a:endParaRPr lang="en-US"/>
           </a:p>
@@ -3096,48 +3099,112 @@
           <a:chExt cx="0" cy="0"/>
         </a:xfrm>
       </p:grpSpPr>
-      <p:sp>
-        <p:nvSpPr>
-          <p:cNvPr id="20" name="Oval 19"/>
-          <p:cNvSpPr>
-            <a:spLocks noChangeAspect="1"/>
-          </p:cNvSpPr>
+      <p:pic>
+        <p:nvPicPr>
+          <p:cNvPr id="4" name="Picture 3" descr="payfive_logo_v5.png"/>
+          <p:cNvPicPr>
+            <a:picLocks noChangeAspect="1"/>
+          </p:cNvPicPr>
           <p:nvPr/>
-        </p:nvSpPr>
+        </p:nvPicPr>
+        <p:blipFill>
+          <a:blip r:embed="rId2">
+            <a:extLst>
+              <a:ext uri="{28A0092B-C50C-407E-A947-70E740481C1C}">
+                <a14:useLocalDpi xmlns:a14="http://schemas.microsoft.com/office/drawing/2010/main" val="0"/>
+              </a:ext>
+            </a:extLst>
+          </a:blip>
+          <a:stretch>
+            <a:fillRect/>
+          </a:stretch>
+        </p:blipFill>
         <p:spPr>
           <a:xfrm>
-            <a:off x="2171206" y="751931"/>
-            <a:ext cx="3200750" cy="3197283"/>
+            <a:off x="3980011" y="1416981"/>
+            <a:ext cx="2877312" cy="2889504"/>
+          </a:xfrm>
+          <a:prstGeom prst="rect">
+            <a:avLst/>
+          </a:prstGeom>
+          <a:effectLst>
+            <a:innerShdw blurRad="63500" dist="50800" dir="5400000">
+              <a:prstClr val="black">
+                <a:alpha val="50000"/>
+              </a:prstClr>
+            </a:innerShdw>
+          </a:effectLst>
+        </p:spPr>
+      </p:pic>
+    </p:spTree>
+    <p:extLst>
+      <p:ext uri="{BB962C8B-B14F-4D97-AF65-F5344CB8AC3E}">
+        <p14:creationId xmlns:p14="http://schemas.microsoft.com/office/powerpoint/2010/main" val="2038102701"/>
+      </p:ext>
+    </p:extLst>
+  </p:cSld>
+  <p:clrMapOvr>
+    <a:masterClrMapping/>
+  </p:clrMapOvr>
+</p:sld>
+</file>
+
+<file path=ppt/slides/slide2.xml><?xml version="1.0" encoding="utf-8"?>
+<p:sld xmlns:a="http://schemas.openxmlformats.org/drawingml/2006/main" xmlns:r="http://schemas.openxmlformats.org/officeDocument/2006/relationships" xmlns:p="http://schemas.openxmlformats.org/presentationml/2006/main">
+  <p:cSld>
+    <p:spTree>
+      <p:nvGrpSpPr>
+        <p:cNvPr id="1" name=""/>
+        <p:cNvGrpSpPr/>
+        <p:nvPr/>
+      </p:nvGrpSpPr>
+      <p:grpSpPr>
+        <a:xfrm>
+          <a:off x="0" y="0"/>
+          <a:ext cx="0" cy="0"/>
+          <a:chOff x="0" y="0"/>
+          <a:chExt cx="0" cy="0"/>
+        </a:xfrm>
+      </p:grpSpPr>
+      <p:sp>
+        <p:nvSpPr>
+          <p:cNvPr id="4" name="Oval 3"/>
+          <p:cNvSpPr/>
+          <p:nvPr/>
+        </p:nvSpPr>
+        <p:spPr>
+          <a:xfrm>
+            <a:off x="3061584" y="1608751"/>
+            <a:ext cx="2743200" cy="2743200"/>
           </a:xfrm>
           <a:prstGeom prst="ellipse">
             <a:avLst/>
           </a:prstGeom>
           <a:solidFill>
-            <a:srgbClr val="22815B"/>
+            <a:srgbClr val="217F58"/>
           </a:solidFill>
-          <a:ln w="57150" cmpd="sng">
+          <a:ln w="38100" cmpd="sng">
             <a:noFill/>
           </a:ln>
           <a:effectLst>
-            <a:innerShdw blurRad="114300">
+            <a:outerShdw blurRad="63500" dist="76200" dir="16200000" rotWithShape="0">
               <a:schemeClr val="tx1">
-                <a:lumMod val="65000"/>
-                <a:lumOff val="35000"/>
+                <a:lumMod val="50000"/>
+                <a:lumOff val="50000"/>
+                <a:alpha val="91000"/>
               </a:schemeClr>
-            </a:innerShdw>
+            </a:outerShdw>
           </a:effectLst>
         </p:spPr>
         <p:style>
-          <a:lnRef idx="2">
-            <a:schemeClr val="accent3">
-              <a:shade val="50000"/>
-            </a:schemeClr>
+          <a:lnRef idx="1">
+            <a:schemeClr val="accent1"/>
           </a:lnRef>
-          <a:fillRef idx="1">
-            <a:schemeClr val="accent3"/>
+          <a:fillRef idx="3">
+            <a:schemeClr val="accent1"/>
           </a:fillRef>
-          <a:effectRef idx="0">
-            <a:schemeClr val="accent3"/>
+          <a:effectRef idx="2">
+            <a:schemeClr val="accent1"/>
           </a:effectRef>
           <a:fontRef idx="minor">
             <a:schemeClr val="lt1"/>
@@ -3148,13 +3215,55 @@
           <a:lstStyle/>
           <a:p>
             <a:pPr algn="ctr"/>
-            <a:endParaRPr lang="en-US" dirty="0"/>
+            <a:endParaRPr lang="en-US"/>
+          </a:p>
+        </p:txBody>
+      </p:sp>
+      <p:sp>
+        <p:nvSpPr>
+          <p:cNvPr id="6" name="TextBox 5"/>
+          <p:cNvSpPr txBox="1"/>
+          <p:nvPr/>
+        </p:nvSpPr>
+        <p:spPr>
+          <a:xfrm>
+            <a:off x="4747708" y="2865005"/>
+            <a:ext cx="605692" cy="1200329"/>
+          </a:xfrm>
+          <a:prstGeom prst="rect">
+            <a:avLst/>
+          </a:prstGeom>
+          <a:noFill/>
+        </p:spPr>
+        <p:txBody>
+          <a:bodyPr wrap="square" rtlCol="0">
+            <a:spAutoFit/>
+          </a:bodyPr>
+          <a:lstStyle/>
+          <a:p>
+            <a:r>
+              <a:rPr lang="en-US" sz="7200" dirty="0" smtClean="0">
+                <a:solidFill>
+                  <a:srgbClr val="F0F0F0"/>
+                </a:solidFill>
+                <a:latin typeface="Abadi MT Condensed Extra Bold"/>
+                <a:cs typeface="Abadi MT Condensed Extra Bold"/>
+              </a:rPr>
+              <a:t>$</a:t>
+            </a:r>
+            <a:endParaRPr lang="en-US" sz="7200" dirty="0">
+              <a:solidFill>
+                <a:srgbClr val="F0F0F0"/>
+              </a:solidFill>
+              <a:latin typeface="Abadi MT Condensed Extra Bold"/>
+              <a:cs typeface="Abadi MT Condensed Extra Bold"/>
+            </a:endParaRPr>
           </a:p>
         </p:txBody>
       </p:sp>
       <p:pic>
         <p:nvPicPr>
-          <p:cNvPr id="24" name="Picture 23" descr="hand3.png"/>
+          <p:cNvPr id="2" name="Picture 1" descr="payfive_logo_v5_hand5.png"/>
           <p:cNvPicPr>
             <a:picLocks noChangeAspect="1"/>
           </p:cNvPicPr>
@@ -3163,24 +3272,21 @@
         <p:blipFill>
           <a:blip r:embed="rId2">
             <a:duotone>
-              <a:prstClr val="black"/>
-              <a:srgbClr val="D9C3A5">
-                <a:tint val="50000"/>
-                <a:satMod val="180000"/>
-              </a:srgbClr>
+              <a:schemeClr val="bg2">
+                <a:shade val="45000"/>
+                <a:satMod val="135000"/>
+              </a:schemeClr>
+              <a:prstClr val="white"/>
             </a:duotone>
             <a:extLst>
               <a:ext uri="{BEBA8EAE-BF5A-486C-A8C5-ECC9F3942E4B}">
                 <a14:imgProps xmlns:a14="http://schemas.microsoft.com/office/drawing/2010/main">
                   <a14:imgLayer r:embed="rId3">
                     <a14:imgEffect>
-                      <a14:colorTemperature colorTemp="4700"/>
+                      <a14:sharpenSoften amount="-25000"/>
                     </a14:imgEffect>
                     <a14:imgEffect>
-                      <a14:saturation sat="66000"/>
-                    </a14:imgEffect>
-                    <a14:imgEffect>
-                      <a14:brightnessContrast bright="40000" contrast="20000"/>
+                      <a14:brightnessContrast contrast="20000"/>
                     </a14:imgEffect>
                   </a14:imgLayer>
                 </a14:imgProps>
@@ -3196,25 +3302,147 @@
         </p:blipFill>
         <p:spPr>
           <a:xfrm>
-            <a:off x="3058508" y="1022811"/>
-            <a:ext cx="1948144" cy="2226450"/>
+            <a:off x="3500053" y="1978094"/>
+            <a:ext cx="1571533" cy="1875421"/>
           </a:xfrm>
           <a:prstGeom prst="rect">
             <a:avLst/>
           </a:prstGeom>
         </p:spPr>
       </p:pic>
+    </p:spTree>
+    <p:extLst>
+      <p:ext uri="{BB962C8B-B14F-4D97-AF65-F5344CB8AC3E}">
+        <p14:creationId xmlns:p14="http://schemas.microsoft.com/office/powerpoint/2010/main" val="3136529976"/>
+      </p:ext>
+    </p:extLst>
+  </p:cSld>
+  <p:clrMapOvr>
+    <a:masterClrMapping/>
+  </p:clrMapOvr>
+  <p:timing>
+    <p:tnLst>
+      <p:par>
+        <p:cTn xmlns:p14="http://schemas.microsoft.com/office/powerpoint/2010/main" id="1" dur="indefinite" restart="never" nodeType="tmRoot"/>
+      </p:par>
+    </p:tnLst>
+  </p:timing>
+</p:sld>
+</file>
+
+<file path=ppt/slides/slide3.xml><?xml version="1.0" encoding="utf-8"?>
+<p:sld xmlns:a="http://schemas.openxmlformats.org/drawingml/2006/main" xmlns:r="http://schemas.openxmlformats.org/officeDocument/2006/relationships" xmlns:p="http://schemas.openxmlformats.org/presentationml/2006/main">
+  <p:cSld>
+    <p:spTree>
+      <p:nvGrpSpPr>
+        <p:cNvPr id="1" name=""/>
+        <p:cNvGrpSpPr/>
+        <p:nvPr/>
+      </p:nvGrpSpPr>
+      <p:grpSpPr>
+        <a:xfrm>
+          <a:off x="0" y="0"/>
+          <a:ext cx="0" cy="0"/>
+          <a:chOff x="0" y="0"/>
+          <a:chExt cx="0" cy="0"/>
+        </a:xfrm>
+      </p:grpSpPr>
+      <p:sp>
+        <p:nvSpPr>
+          <p:cNvPr id="6" name="TextBox 5"/>
+          <p:cNvSpPr txBox="1"/>
+          <p:nvPr/>
+        </p:nvSpPr>
+        <p:spPr>
+          <a:xfrm>
+            <a:off x="5090884" y="3227029"/>
+            <a:ext cx="605692" cy="1200329"/>
+          </a:xfrm>
+          <a:prstGeom prst="rect">
+            <a:avLst/>
+          </a:prstGeom>
+          <a:noFill/>
+        </p:spPr>
+        <p:txBody>
+          <a:bodyPr wrap="square" rtlCol="0">
+            <a:spAutoFit/>
+          </a:bodyPr>
+          <a:lstStyle/>
+          <a:p>
+            <a:r>
+              <a:rPr lang="en-US" sz="7200" dirty="0" smtClean="0">
+                <a:solidFill>
+                  <a:srgbClr val="11855A"/>
+                </a:solidFill>
+                <a:latin typeface="Abadi MT Condensed Extra Bold"/>
+                <a:cs typeface="Abadi MT Condensed Extra Bold"/>
+              </a:rPr>
+              <a:t>$</a:t>
+            </a:r>
+            <a:endParaRPr lang="en-US" sz="7200" dirty="0">
+              <a:solidFill>
+                <a:srgbClr val="11855A"/>
+              </a:solidFill>
+              <a:latin typeface="Abadi MT Condensed Extra Bold"/>
+              <a:cs typeface="Abadi MT Condensed Extra Bold"/>
+            </a:endParaRPr>
+          </a:p>
+        </p:txBody>
+      </p:sp>
+      <p:sp>
+        <p:nvSpPr>
+          <p:cNvPr id="7" name="Oval 6"/>
+          <p:cNvSpPr/>
+          <p:nvPr/>
+        </p:nvSpPr>
+        <p:spPr>
+          <a:xfrm>
+            <a:off x="3287595" y="1965555"/>
+            <a:ext cx="2743200" cy="2743200"/>
+          </a:xfrm>
+          <a:prstGeom prst="ellipse">
+            <a:avLst/>
+          </a:prstGeom>
+          <a:noFill/>
+          <a:ln w="127000" cmpd="sng">
+            <a:solidFill>
+              <a:srgbClr val="217F58"/>
+            </a:solidFill>
+          </a:ln>
+        </p:spPr>
+        <p:style>
+          <a:lnRef idx="1">
+            <a:schemeClr val="accent1"/>
+          </a:lnRef>
+          <a:fillRef idx="3">
+            <a:schemeClr val="accent1"/>
+          </a:fillRef>
+          <a:effectRef idx="2">
+            <a:schemeClr val="accent1"/>
+          </a:effectRef>
+          <a:fontRef idx="minor">
+            <a:schemeClr val="lt1"/>
+          </a:fontRef>
+        </p:style>
+        <p:txBody>
+          <a:bodyPr rtlCol="0" anchor="ctr"/>
+          <a:lstStyle/>
+          <a:p>
+            <a:pPr algn="ctr"/>
+            <a:endParaRPr lang="en-US"/>
+          </a:p>
+        </p:txBody>
+      </p:sp>
       <p:pic>
         <p:nvPicPr>
-          <p:cNvPr id="25" name="Picture 24" descr="hand3.png"/>
+          <p:cNvPr id="9" name="Picture 8" descr="payfive_logo_v5_hand3.png"/>
           <p:cNvPicPr>
             <a:picLocks noChangeAspect="1"/>
           </p:cNvPicPr>
           <p:nvPr/>
         </p:nvPicPr>
         <p:blipFill>
-          <a:blip r:embed="rId4">
-            <a:lum bright="70000" contrast="-70000"/>
+          <a:blip r:embed="rId2">
             <a:extLst>
               <a:ext uri="{28A0092B-C50C-407E-A947-70E740481C1C}">
                 <a14:useLocalDpi xmlns:a14="http://schemas.microsoft.com/office/drawing/2010/main" val="0"/>
@@ -3226,42 +3454,9 @@
           </a:stretch>
         </p:blipFill>
         <p:spPr>
-          <a:xfrm flipH="1">
-            <a:off x="2494178" y="1351475"/>
-            <a:ext cx="2040097" cy="2331539"/>
-          </a:xfrm>
-          <a:prstGeom prst="rect">
-            <a:avLst/>
-          </a:prstGeom>
-          <a:ln>
-            <a:noFill/>
-          </a:ln>
-        </p:spPr>
-      </p:pic>
-      <p:pic>
-        <p:nvPicPr>
-          <p:cNvPr id="19" name="Picture 18" descr="dollar_color.png"/>
-          <p:cNvPicPr>
-            <a:picLocks noChangeAspect="1"/>
-          </p:cNvPicPr>
-          <p:nvPr/>
-        </p:nvPicPr>
-        <p:blipFill>
-          <a:blip r:embed="rId5">
-            <a:extLst>
-              <a:ext uri="{28A0092B-C50C-407E-A947-70E740481C1C}">
-                <a14:useLocalDpi xmlns:a14="http://schemas.microsoft.com/office/drawing/2010/main" val="0"/>
-              </a:ext>
-            </a:extLst>
-          </a:blip>
-          <a:stretch>
-            <a:fillRect/>
-          </a:stretch>
-        </p:blipFill>
-        <p:spPr>
-          <a:xfrm>
-            <a:off x="3195411" y="2813257"/>
-            <a:ext cx="461919" cy="700911"/>
+          <a:xfrm rot="1652706">
+            <a:off x="3269530" y="2081979"/>
+            <a:ext cx="2408338" cy="2389224"/>
           </a:xfrm>
           <a:prstGeom prst="rect">
             <a:avLst/>
@@ -3271,17 +3466,24 @@
     </p:spTree>
     <p:extLst>
       <p:ext uri="{BB962C8B-B14F-4D97-AF65-F5344CB8AC3E}">
-        <p14:creationId xmlns:p14="http://schemas.microsoft.com/office/powerpoint/2010/main" val="2411191289"/>
+        <p14:creationId xmlns:p14="http://schemas.microsoft.com/office/powerpoint/2010/main" val="3458180731"/>
       </p:ext>
     </p:extLst>
   </p:cSld>
   <p:clrMapOvr>
     <a:masterClrMapping/>
   </p:clrMapOvr>
+  <p:timing>
+    <p:tnLst>
+      <p:par>
+        <p:cTn xmlns:p14="http://schemas.microsoft.com/office/powerpoint/2010/main" id="1" dur="indefinite" restart="never" nodeType="tmRoot"/>
+      </p:par>
+    </p:tnLst>
+  </p:timing>
 </p:sld>
 </file>
 
-<file path=ppt/slides/slide2.xml><?xml version="1.0" encoding="utf-8"?>
+<file path=ppt/slides/slide4.xml><?xml version="1.0" encoding="utf-8"?>
 <p:sld xmlns:a="http://schemas.openxmlformats.org/drawingml/2006/main" xmlns:r="http://schemas.openxmlformats.org/officeDocument/2006/relationships" xmlns:p="http://schemas.openxmlformats.org/presentationml/2006/main">
   <p:cSld>
     <p:spTree>
@@ -3507,6 +3709,222 @@
   <p:clrMapOvr>
     <a:masterClrMapping/>
   </p:clrMapOvr>
+  <p:timing>
+    <p:tnLst>
+      <p:par>
+        <p:cTn xmlns:p14="http://schemas.microsoft.com/office/powerpoint/2010/main" id="1" dur="indefinite" restart="never" nodeType="tmRoot"/>
+      </p:par>
+    </p:tnLst>
+  </p:timing>
+</p:sld>
+</file>
+
+<file path=ppt/slides/slide5.xml><?xml version="1.0" encoding="utf-8"?>
+<p:sld xmlns:a="http://schemas.openxmlformats.org/drawingml/2006/main" xmlns:r="http://schemas.openxmlformats.org/officeDocument/2006/relationships" xmlns:p="http://schemas.openxmlformats.org/presentationml/2006/main">
+  <p:cSld>
+    <p:spTree>
+      <p:nvGrpSpPr>
+        <p:cNvPr id="1" name=""/>
+        <p:cNvGrpSpPr/>
+        <p:nvPr/>
+      </p:nvGrpSpPr>
+      <p:grpSpPr>
+        <a:xfrm>
+          <a:off x="0" y="0"/>
+          <a:ext cx="0" cy="0"/>
+          <a:chOff x="0" y="0"/>
+          <a:chExt cx="0" cy="0"/>
+        </a:xfrm>
+      </p:grpSpPr>
+      <p:sp>
+        <p:nvSpPr>
+          <p:cNvPr id="20" name="Oval 19"/>
+          <p:cNvSpPr>
+            <a:spLocks noChangeAspect="1"/>
+          </p:cNvSpPr>
+          <p:nvPr/>
+        </p:nvSpPr>
+        <p:spPr>
+          <a:xfrm>
+            <a:off x="2171206" y="751931"/>
+            <a:ext cx="3200750" cy="3197283"/>
+          </a:xfrm>
+          <a:prstGeom prst="ellipse">
+            <a:avLst/>
+          </a:prstGeom>
+          <a:solidFill>
+            <a:srgbClr val="22815B"/>
+          </a:solidFill>
+          <a:ln w="57150" cmpd="sng">
+            <a:noFill/>
+          </a:ln>
+          <a:effectLst>
+            <a:innerShdw blurRad="114300">
+              <a:schemeClr val="tx1">
+                <a:lumMod val="65000"/>
+                <a:lumOff val="35000"/>
+              </a:schemeClr>
+            </a:innerShdw>
+          </a:effectLst>
+        </p:spPr>
+        <p:style>
+          <a:lnRef idx="2">
+            <a:schemeClr val="accent3">
+              <a:shade val="50000"/>
+            </a:schemeClr>
+          </a:lnRef>
+          <a:fillRef idx="1">
+            <a:schemeClr val="accent3"/>
+          </a:fillRef>
+          <a:effectRef idx="0">
+            <a:schemeClr val="accent3"/>
+          </a:effectRef>
+          <a:fontRef idx="minor">
+            <a:schemeClr val="lt1"/>
+          </a:fontRef>
+        </p:style>
+        <p:txBody>
+          <a:bodyPr rtlCol="0" anchor="ctr"/>
+          <a:lstStyle/>
+          <a:p>
+            <a:pPr algn="ctr"/>
+            <a:endParaRPr lang="en-US" dirty="0"/>
+          </a:p>
+        </p:txBody>
+      </p:sp>
+      <p:pic>
+        <p:nvPicPr>
+          <p:cNvPr id="24" name="Picture 23" descr="hand3.png"/>
+          <p:cNvPicPr>
+            <a:picLocks noChangeAspect="1"/>
+          </p:cNvPicPr>
+          <p:nvPr/>
+        </p:nvPicPr>
+        <p:blipFill>
+          <a:blip r:embed="rId2">
+            <a:duotone>
+              <a:prstClr val="black"/>
+              <a:srgbClr val="D9C3A5">
+                <a:tint val="50000"/>
+                <a:satMod val="180000"/>
+              </a:srgbClr>
+            </a:duotone>
+            <a:extLst>
+              <a:ext uri="{BEBA8EAE-BF5A-486C-A8C5-ECC9F3942E4B}">
+                <a14:imgProps xmlns:a14="http://schemas.microsoft.com/office/drawing/2010/main">
+                  <a14:imgLayer r:embed="rId3">
+                    <a14:imgEffect>
+                      <a14:colorTemperature colorTemp="4700"/>
+                    </a14:imgEffect>
+                    <a14:imgEffect>
+                      <a14:saturation sat="66000"/>
+                    </a14:imgEffect>
+                    <a14:imgEffect>
+                      <a14:brightnessContrast bright="40000" contrast="20000"/>
+                    </a14:imgEffect>
+                  </a14:imgLayer>
+                </a14:imgProps>
+              </a:ext>
+              <a:ext uri="{28A0092B-C50C-407E-A947-70E740481C1C}">
+                <a14:useLocalDpi xmlns:a14="http://schemas.microsoft.com/office/drawing/2010/main" val="0"/>
+              </a:ext>
+            </a:extLst>
+          </a:blip>
+          <a:stretch>
+            <a:fillRect/>
+          </a:stretch>
+        </p:blipFill>
+        <p:spPr>
+          <a:xfrm>
+            <a:off x="3058508" y="1022811"/>
+            <a:ext cx="1948144" cy="2226450"/>
+          </a:xfrm>
+          <a:prstGeom prst="rect">
+            <a:avLst/>
+          </a:prstGeom>
+        </p:spPr>
+      </p:pic>
+      <p:pic>
+        <p:nvPicPr>
+          <p:cNvPr id="25" name="Picture 24" descr="hand3.png"/>
+          <p:cNvPicPr>
+            <a:picLocks noChangeAspect="1"/>
+          </p:cNvPicPr>
+          <p:nvPr/>
+        </p:nvPicPr>
+        <p:blipFill>
+          <a:blip r:embed="rId4">
+            <a:lum bright="70000" contrast="-70000"/>
+            <a:extLst>
+              <a:ext uri="{28A0092B-C50C-407E-A947-70E740481C1C}">
+                <a14:useLocalDpi xmlns:a14="http://schemas.microsoft.com/office/drawing/2010/main" val="0"/>
+              </a:ext>
+            </a:extLst>
+          </a:blip>
+          <a:stretch>
+            <a:fillRect/>
+          </a:stretch>
+        </p:blipFill>
+        <p:spPr>
+          <a:xfrm flipH="1">
+            <a:off x="2494178" y="1351475"/>
+            <a:ext cx="2040097" cy="2331539"/>
+          </a:xfrm>
+          <a:prstGeom prst="rect">
+            <a:avLst/>
+          </a:prstGeom>
+          <a:ln>
+            <a:noFill/>
+          </a:ln>
+        </p:spPr>
+      </p:pic>
+      <p:pic>
+        <p:nvPicPr>
+          <p:cNvPr id="19" name="Picture 18" descr="dollar_color.png"/>
+          <p:cNvPicPr>
+            <a:picLocks noChangeAspect="1"/>
+          </p:cNvPicPr>
+          <p:nvPr/>
+        </p:nvPicPr>
+        <p:blipFill>
+          <a:blip r:embed="rId5">
+            <a:extLst>
+              <a:ext uri="{28A0092B-C50C-407E-A947-70E740481C1C}">
+                <a14:useLocalDpi xmlns:a14="http://schemas.microsoft.com/office/drawing/2010/main" val="0"/>
+              </a:ext>
+            </a:extLst>
+          </a:blip>
+          <a:stretch>
+            <a:fillRect/>
+          </a:stretch>
+        </p:blipFill>
+        <p:spPr>
+          <a:xfrm>
+            <a:off x="3195411" y="2813257"/>
+            <a:ext cx="461919" cy="700911"/>
+          </a:xfrm>
+          <a:prstGeom prst="rect">
+            <a:avLst/>
+          </a:prstGeom>
+        </p:spPr>
+      </p:pic>
+    </p:spTree>
+    <p:extLst>
+      <p:ext uri="{BB962C8B-B14F-4D97-AF65-F5344CB8AC3E}">
+        <p14:creationId xmlns:p14="http://schemas.microsoft.com/office/powerpoint/2010/main" val="2411191289"/>
+      </p:ext>
+    </p:extLst>
+  </p:cSld>
+  <p:clrMapOvr>
+    <a:masterClrMapping/>
+  </p:clrMapOvr>
+  <p:timing>
+    <p:tnLst>
+      <p:par>
+        <p:cTn xmlns:p14="http://schemas.microsoft.com/office/powerpoint/2010/main" id="1" dur="indefinite" restart="never" nodeType="tmRoot"/>
+      </p:par>
+    </p:tnLst>
+  </p:timing>
 </p:sld>
 </file>
 

</xml_diff>